<commit_message>
content: Hides "flows" algorithms and other improvements
 - Clarify Dijkstra's and update rule
 - Replace code by pseudo-code for Bellman-Ford
 - Replace code by pseudo-code for Floyd-Warshall
</commit_message>
<xml_diff>
--- a/source/graphs/intro/_static/graphs.pptx
+++ b/source/graphs/intro/_static/graphs.pptx
@@ -16331,31 +16331,6 @@
       </p:sp>
       <p:sp>
         <p:nvSpPr>
-          <p:cNvPr id="6" name="Content Placeholder 5">
-            <a:extLst>
-              <a:ext uri="{FF2B5EF4-FFF2-40B4-BE49-F238E27FC236}">
-                <a16:creationId xmlns:a16="http://schemas.microsoft.com/office/drawing/2014/main" id="{9DA93BB3-1F05-1DF5-2BC1-08B192711957}"/>
-              </a:ext>
-            </a:extLst>
-          </p:cNvPr>
-          <p:cNvSpPr>
-            <a:spLocks noGrp="1"/>
-          </p:cNvSpPr>
-          <p:nvPr>
-            <p:ph idx="1"/>
-          </p:nvPr>
-        </p:nvSpPr>
-        <p:spPr/>
-        <p:txBody>
-          <a:bodyPr/>
-          <a:lstStyle/>
-          <a:p>
-            <a:endParaRPr lang="en-NO"/>
-          </a:p>
-        </p:txBody>
-      </p:sp>
-      <p:sp>
-        <p:nvSpPr>
           <p:cNvPr id="4" name="Slide Number Placeholder 3">
             <a:extLst>
               <a:ext uri="{FF2B5EF4-FFF2-40B4-BE49-F238E27FC236}">
@@ -16380,6 +16355,1795 @@
               <a:t>19</a:t>
             </a:fld>
             <a:endParaRPr lang="en-NO"/>
+          </a:p>
+        </p:txBody>
+      </p:sp>
+      <p:sp>
+        <p:nvSpPr>
+          <p:cNvPr id="7" name="Rectangle 6">
+            <a:extLst>
+              <a:ext uri="{FF2B5EF4-FFF2-40B4-BE49-F238E27FC236}">
+                <a16:creationId xmlns:a16="http://schemas.microsoft.com/office/drawing/2014/main" id="{C1253A34-9C65-34AB-781B-719B47FC760F}"/>
+              </a:ext>
+            </a:extLst>
+          </p:cNvPr>
+          <p:cNvSpPr/>
+          <p:nvPr/>
+        </p:nvSpPr>
+        <p:spPr>
+          <a:xfrm>
+            <a:off x="1643297" y="2163757"/>
+            <a:ext cx="1109272" cy="479685"/>
+          </a:xfrm>
+          <a:prstGeom prst="rect">
+            <a:avLst/>
+          </a:prstGeom>
+        </p:spPr>
+        <p:style>
+          <a:lnRef idx="2">
+            <a:schemeClr val="accent1">
+              <a:shade val="50000"/>
+            </a:schemeClr>
+          </a:lnRef>
+          <a:fillRef idx="1">
+            <a:schemeClr val="accent1"/>
+          </a:fillRef>
+          <a:effectRef idx="0">
+            <a:schemeClr val="accent1"/>
+          </a:effectRef>
+          <a:fontRef idx="minor">
+            <a:schemeClr val="lt1"/>
+          </a:fontRef>
+        </p:style>
+        <p:txBody>
+          <a:bodyPr rtlCol="0" anchor="ctr"/>
+          <a:lstStyle/>
+          <a:p>
+            <a:pPr algn="ctr"/>
+            <a:r>
+              <a:rPr lang="en-NO" b="1" dirty="0">
+                <a:solidFill>
+                  <a:schemeClr val="accent3"/>
+                </a:solidFill>
+              </a:rPr>
+              <a:t>J</a:t>
+            </a:r>
+            <a:r>
+              <a:rPr lang="en-NO" dirty="0"/>
+              <a:t>ohn</a:t>
+            </a:r>
+          </a:p>
+        </p:txBody>
+      </p:sp>
+      <p:sp>
+        <p:nvSpPr>
+          <p:cNvPr id="8" name="Rectangle 7">
+            <a:extLst>
+              <a:ext uri="{FF2B5EF4-FFF2-40B4-BE49-F238E27FC236}">
+                <a16:creationId xmlns:a16="http://schemas.microsoft.com/office/drawing/2014/main" id="{F5A62CF4-6CC8-FEC3-E056-D15068087058}"/>
+              </a:ext>
+            </a:extLst>
+          </p:cNvPr>
+          <p:cNvSpPr/>
+          <p:nvPr/>
+        </p:nvSpPr>
+        <p:spPr>
+          <a:xfrm>
+            <a:off x="3843104" y="3429001"/>
+            <a:ext cx="1109272" cy="479685"/>
+          </a:xfrm>
+          <a:prstGeom prst="rect">
+            <a:avLst/>
+          </a:prstGeom>
+        </p:spPr>
+        <p:style>
+          <a:lnRef idx="2">
+            <a:schemeClr val="accent1">
+              <a:shade val="50000"/>
+            </a:schemeClr>
+          </a:lnRef>
+          <a:fillRef idx="1">
+            <a:schemeClr val="accent1"/>
+          </a:fillRef>
+          <a:effectRef idx="0">
+            <a:schemeClr val="accent1"/>
+          </a:effectRef>
+          <a:fontRef idx="minor">
+            <a:schemeClr val="lt1"/>
+          </a:fontRef>
+        </p:style>
+        <p:txBody>
+          <a:bodyPr rtlCol="0" anchor="ctr"/>
+          <a:lstStyle/>
+          <a:p>
+            <a:pPr algn="ctr"/>
+            <a:r>
+              <a:rPr lang="en-NO" b="1" dirty="0">
+                <a:solidFill>
+                  <a:schemeClr val="accent3"/>
+                </a:solidFill>
+              </a:rPr>
+              <a:t>F</a:t>
+            </a:r>
+            <a:r>
+              <a:rPr lang="en-NO" dirty="0"/>
+              <a:t>rank</a:t>
+            </a:r>
+          </a:p>
+        </p:txBody>
+      </p:sp>
+      <p:sp>
+        <p:nvSpPr>
+          <p:cNvPr id="9" name="Rectangle 8">
+            <a:extLst>
+              <a:ext uri="{FF2B5EF4-FFF2-40B4-BE49-F238E27FC236}">
+                <a16:creationId xmlns:a16="http://schemas.microsoft.com/office/drawing/2014/main" id="{EB0DE42F-23E6-BC7B-2A06-18339935AB14}"/>
+              </a:ext>
+            </a:extLst>
+          </p:cNvPr>
+          <p:cNvSpPr/>
+          <p:nvPr/>
+        </p:nvSpPr>
+        <p:spPr>
+          <a:xfrm>
+            <a:off x="1643297" y="3451227"/>
+            <a:ext cx="1109272" cy="479685"/>
+          </a:xfrm>
+          <a:prstGeom prst="rect">
+            <a:avLst/>
+          </a:prstGeom>
+        </p:spPr>
+        <p:style>
+          <a:lnRef idx="2">
+            <a:schemeClr val="accent1">
+              <a:shade val="50000"/>
+            </a:schemeClr>
+          </a:lnRef>
+          <a:fillRef idx="1">
+            <a:schemeClr val="accent1"/>
+          </a:fillRef>
+          <a:effectRef idx="0">
+            <a:schemeClr val="accent1"/>
+          </a:effectRef>
+          <a:fontRef idx="minor">
+            <a:schemeClr val="lt1"/>
+          </a:fontRef>
+        </p:style>
+        <p:txBody>
+          <a:bodyPr rtlCol="0" anchor="ctr"/>
+          <a:lstStyle/>
+          <a:p>
+            <a:pPr algn="ctr"/>
+            <a:r>
+              <a:rPr lang="en-NO" b="1" dirty="0">
+                <a:solidFill>
+                  <a:schemeClr val="accent3"/>
+                </a:solidFill>
+              </a:rPr>
+              <a:t>M</a:t>
+            </a:r>
+            <a:r>
+              <a:rPr lang="en-NO" dirty="0"/>
+              <a:t>ary</a:t>
+            </a:r>
+          </a:p>
+        </p:txBody>
+      </p:sp>
+      <p:sp>
+        <p:nvSpPr>
+          <p:cNvPr id="10" name="Rectangle 9">
+            <a:extLst>
+              <a:ext uri="{FF2B5EF4-FFF2-40B4-BE49-F238E27FC236}">
+                <a16:creationId xmlns:a16="http://schemas.microsoft.com/office/drawing/2014/main" id="{C8A6F436-77F4-AEDA-F4F8-241902EFCC8B}"/>
+              </a:ext>
+            </a:extLst>
+          </p:cNvPr>
+          <p:cNvSpPr/>
+          <p:nvPr/>
+        </p:nvSpPr>
+        <p:spPr>
+          <a:xfrm>
+            <a:off x="3843104" y="2163757"/>
+            <a:ext cx="1109272" cy="479685"/>
+          </a:xfrm>
+          <a:prstGeom prst="rect">
+            <a:avLst/>
+          </a:prstGeom>
+        </p:spPr>
+        <p:style>
+          <a:lnRef idx="2">
+            <a:schemeClr val="accent1">
+              <a:shade val="50000"/>
+            </a:schemeClr>
+          </a:lnRef>
+          <a:fillRef idx="1">
+            <a:schemeClr val="accent1"/>
+          </a:fillRef>
+          <a:effectRef idx="0">
+            <a:schemeClr val="accent1"/>
+          </a:effectRef>
+          <a:fontRef idx="minor">
+            <a:schemeClr val="lt1"/>
+          </a:fontRef>
+        </p:style>
+        <p:txBody>
+          <a:bodyPr rtlCol="0" anchor="ctr"/>
+          <a:lstStyle/>
+          <a:p>
+            <a:pPr algn="ctr"/>
+            <a:r>
+              <a:rPr lang="en-NO" b="1" dirty="0">
+                <a:solidFill>
+                  <a:schemeClr val="accent3"/>
+                </a:solidFill>
+              </a:rPr>
+              <a:t>L</a:t>
+            </a:r>
+            <a:r>
+              <a:rPr lang="en-NO" dirty="0"/>
+              <a:t>isa</a:t>
+            </a:r>
+          </a:p>
+        </p:txBody>
+      </p:sp>
+      <p:sp>
+        <p:nvSpPr>
+          <p:cNvPr id="11" name="Rectangle 10">
+            <a:extLst>
+              <a:ext uri="{FF2B5EF4-FFF2-40B4-BE49-F238E27FC236}">
+                <a16:creationId xmlns:a16="http://schemas.microsoft.com/office/drawing/2014/main" id="{769FC83A-E550-4F64-86DC-8F99AA752B5C}"/>
+              </a:ext>
+            </a:extLst>
+          </p:cNvPr>
+          <p:cNvSpPr/>
+          <p:nvPr/>
+        </p:nvSpPr>
+        <p:spPr>
+          <a:xfrm>
+            <a:off x="2222916" y="4585900"/>
+            <a:ext cx="1109272" cy="479685"/>
+          </a:xfrm>
+          <a:prstGeom prst="rect">
+            <a:avLst/>
+          </a:prstGeom>
+        </p:spPr>
+        <p:style>
+          <a:lnRef idx="2">
+            <a:schemeClr val="accent1">
+              <a:shade val="50000"/>
+            </a:schemeClr>
+          </a:lnRef>
+          <a:fillRef idx="1">
+            <a:schemeClr val="accent1"/>
+          </a:fillRef>
+          <a:effectRef idx="0">
+            <a:schemeClr val="accent1"/>
+          </a:effectRef>
+          <a:fontRef idx="minor">
+            <a:schemeClr val="lt1"/>
+          </a:fontRef>
+        </p:style>
+        <p:txBody>
+          <a:bodyPr rtlCol="0" anchor="ctr"/>
+          <a:lstStyle/>
+          <a:p>
+            <a:pPr algn="ctr"/>
+            <a:r>
+              <a:rPr lang="en-NO" b="1" dirty="0">
+                <a:solidFill>
+                  <a:schemeClr val="accent3"/>
+                </a:solidFill>
+              </a:rPr>
+              <a:t>O</a:t>
+            </a:r>
+            <a:r>
+              <a:rPr lang="en-NO" dirty="0"/>
+              <a:t>live</a:t>
+            </a:r>
+          </a:p>
+        </p:txBody>
+      </p:sp>
+      <p:sp>
+        <p:nvSpPr>
+          <p:cNvPr id="12" name="Rectangle 11">
+            <a:extLst>
+              <a:ext uri="{FF2B5EF4-FFF2-40B4-BE49-F238E27FC236}">
+                <a16:creationId xmlns:a16="http://schemas.microsoft.com/office/drawing/2014/main" id="{5EB294CB-6B1B-1BE4-148B-29E9C780698A}"/>
+              </a:ext>
+            </a:extLst>
+          </p:cNvPr>
+          <p:cNvSpPr/>
+          <p:nvPr/>
+        </p:nvSpPr>
+        <p:spPr>
+          <a:xfrm>
+            <a:off x="3843104" y="4589984"/>
+            <a:ext cx="1109272" cy="479685"/>
+          </a:xfrm>
+          <a:prstGeom prst="rect">
+            <a:avLst/>
+          </a:prstGeom>
+        </p:spPr>
+        <p:style>
+          <a:lnRef idx="2">
+            <a:schemeClr val="accent1">
+              <a:shade val="50000"/>
+            </a:schemeClr>
+          </a:lnRef>
+          <a:fillRef idx="1">
+            <a:schemeClr val="accent1"/>
+          </a:fillRef>
+          <a:effectRef idx="0">
+            <a:schemeClr val="accent1"/>
+          </a:effectRef>
+          <a:fontRef idx="minor">
+            <a:schemeClr val="lt1"/>
+          </a:fontRef>
+        </p:style>
+        <p:txBody>
+          <a:bodyPr rtlCol="0" anchor="ctr"/>
+          <a:lstStyle/>
+          <a:p>
+            <a:pPr algn="ctr"/>
+            <a:r>
+              <a:rPr lang="en-NO" b="1" dirty="0">
+                <a:solidFill>
+                  <a:schemeClr val="accent3"/>
+                </a:solidFill>
+              </a:rPr>
+              <a:t>D</a:t>
+            </a:r>
+            <a:r>
+              <a:rPr lang="en-NO" dirty="0"/>
+              <a:t>enis</a:t>
+            </a:r>
+          </a:p>
+        </p:txBody>
+      </p:sp>
+      <p:sp>
+        <p:nvSpPr>
+          <p:cNvPr id="13" name="Rectangle 12">
+            <a:extLst>
+              <a:ext uri="{FF2B5EF4-FFF2-40B4-BE49-F238E27FC236}">
+                <a16:creationId xmlns:a16="http://schemas.microsoft.com/office/drawing/2014/main" id="{1E2861DC-4E70-934C-179E-A62522D33E9E}"/>
+              </a:ext>
+            </a:extLst>
+          </p:cNvPr>
+          <p:cNvSpPr/>
+          <p:nvPr/>
+        </p:nvSpPr>
+        <p:spPr>
+          <a:xfrm>
+            <a:off x="838200" y="4585901"/>
+            <a:ext cx="1109272" cy="479685"/>
+          </a:xfrm>
+          <a:prstGeom prst="rect">
+            <a:avLst/>
+          </a:prstGeom>
+        </p:spPr>
+        <p:style>
+          <a:lnRef idx="2">
+            <a:schemeClr val="accent1">
+              <a:shade val="50000"/>
+            </a:schemeClr>
+          </a:lnRef>
+          <a:fillRef idx="1">
+            <a:schemeClr val="accent1"/>
+          </a:fillRef>
+          <a:effectRef idx="0">
+            <a:schemeClr val="accent1"/>
+          </a:effectRef>
+          <a:fontRef idx="minor">
+            <a:schemeClr val="lt1"/>
+          </a:fontRef>
+        </p:style>
+        <p:txBody>
+          <a:bodyPr rtlCol="0" anchor="ctr"/>
+          <a:lstStyle/>
+          <a:p>
+            <a:pPr algn="ctr"/>
+            <a:r>
+              <a:rPr lang="en-NO" b="1" dirty="0">
+                <a:solidFill>
+                  <a:schemeClr val="accent3"/>
+                </a:solidFill>
+              </a:rPr>
+              <a:t>P</a:t>
+            </a:r>
+            <a:r>
+              <a:rPr lang="en-NO" dirty="0"/>
+              <a:t>eter</a:t>
+            </a:r>
+          </a:p>
+        </p:txBody>
+      </p:sp>
+      <p:cxnSp>
+        <p:nvCxnSpPr>
+          <p:cNvPr id="14" name="Straight Connector 13">
+            <a:extLst>
+              <a:ext uri="{FF2B5EF4-FFF2-40B4-BE49-F238E27FC236}">
+                <a16:creationId xmlns:a16="http://schemas.microsoft.com/office/drawing/2014/main" id="{7A58A9F8-D84B-FAA0-95F2-19A770D43817}"/>
+              </a:ext>
+            </a:extLst>
+          </p:cNvPr>
+          <p:cNvCxnSpPr>
+            <a:stCxn id="7" idx="2"/>
+            <a:endCxn id="9" idx="0"/>
+          </p:cNvCxnSpPr>
+          <p:nvPr/>
+        </p:nvCxnSpPr>
+        <p:spPr>
+          <a:xfrm>
+            <a:off x="2197933" y="2643442"/>
+            <a:ext cx="0" cy="807785"/>
+          </a:xfrm>
+          <a:prstGeom prst="line">
+            <a:avLst/>
+          </a:prstGeom>
+          <a:ln>
+            <a:headEnd type="none" w="med" len="med"/>
+            <a:tailEnd type="arrow" w="med" len="med"/>
+          </a:ln>
+        </p:spPr>
+        <p:style>
+          <a:lnRef idx="3">
+            <a:schemeClr val="accent2"/>
+          </a:lnRef>
+          <a:fillRef idx="0">
+            <a:schemeClr val="accent2"/>
+          </a:fillRef>
+          <a:effectRef idx="2">
+            <a:schemeClr val="accent2"/>
+          </a:effectRef>
+          <a:fontRef idx="minor">
+            <a:schemeClr val="tx1"/>
+          </a:fontRef>
+        </p:style>
+      </p:cxnSp>
+      <p:cxnSp>
+        <p:nvCxnSpPr>
+          <p:cNvPr id="15" name="Straight Connector 14">
+            <a:extLst>
+              <a:ext uri="{FF2B5EF4-FFF2-40B4-BE49-F238E27FC236}">
+                <a16:creationId xmlns:a16="http://schemas.microsoft.com/office/drawing/2014/main" id="{CA5DB2AB-4DD8-A974-E359-48FE41D5D48B}"/>
+              </a:ext>
+            </a:extLst>
+          </p:cNvPr>
+          <p:cNvCxnSpPr>
+            <a:cxnSpLocks/>
+            <a:stCxn id="7" idx="3"/>
+            <a:endCxn id="10" idx="1"/>
+          </p:cNvCxnSpPr>
+          <p:nvPr/>
+        </p:nvCxnSpPr>
+        <p:spPr>
+          <a:xfrm>
+            <a:off x="2752569" y="2403600"/>
+            <a:ext cx="1090535" cy="0"/>
+          </a:xfrm>
+          <a:prstGeom prst="line">
+            <a:avLst/>
+          </a:prstGeom>
+          <a:ln>
+            <a:headEnd type="none" w="med" len="med"/>
+            <a:tailEnd type="arrow" w="med" len="med"/>
+          </a:ln>
+        </p:spPr>
+        <p:style>
+          <a:lnRef idx="3">
+            <a:schemeClr val="accent2"/>
+          </a:lnRef>
+          <a:fillRef idx="0">
+            <a:schemeClr val="accent2"/>
+          </a:fillRef>
+          <a:effectRef idx="2">
+            <a:schemeClr val="accent2"/>
+          </a:effectRef>
+          <a:fontRef idx="minor">
+            <a:schemeClr val="tx1"/>
+          </a:fontRef>
+        </p:style>
+      </p:cxnSp>
+      <p:cxnSp>
+        <p:nvCxnSpPr>
+          <p:cNvPr id="16" name="Straight Connector 15">
+            <a:extLst>
+              <a:ext uri="{FF2B5EF4-FFF2-40B4-BE49-F238E27FC236}">
+                <a16:creationId xmlns:a16="http://schemas.microsoft.com/office/drawing/2014/main" id="{9B03BD8D-FD51-2A62-B723-534DA13D9F27}"/>
+              </a:ext>
+            </a:extLst>
+          </p:cNvPr>
+          <p:cNvCxnSpPr>
+            <a:cxnSpLocks/>
+            <a:stCxn id="8" idx="0"/>
+            <a:endCxn id="10" idx="2"/>
+          </p:cNvCxnSpPr>
+          <p:nvPr/>
+        </p:nvCxnSpPr>
+        <p:spPr>
+          <a:xfrm flipV="1">
+            <a:off x="4397740" y="2643442"/>
+            <a:ext cx="0" cy="785559"/>
+          </a:xfrm>
+          <a:prstGeom prst="line">
+            <a:avLst/>
+          </a:prstGeom>
+          <a:ln>
+            <a:headEnd type="none" w="med" len="med"/>
+            <a:tailEnd type="arrow" w="med" len="med"/>
+          </a:ln>
+        </p:spPr>
+        <p:style>
+          <a:lnRef idx="3">
+            <a:schemeClr val="accent2"/>
+          </a:lnRef>
+          <a:fillRef idx="0">
+            <a:schemeClr val="accent2"/>
+          </a:fillRef>
+          <a:effectRef idx="2">
+            <a:schemeClr val="accent2"/>
+          </a:effectRef>
+          <a:fontRef idx="minor">
+            <a:schemeClr val="tx1"/>
+          </a:fontRef>
+        </p:style>
+      </p:cxnSp>
+      <p:cxnSp>
+        <p:nvCxnSpPr>
+          <p:cNvPr id="17" name="Straight Connector 16">
+            <a:extLst>
+              <a:ext uri="{FF2B5EF4-FFF2-40B4-BE49-F238E27FC236}">
+                <a16:creationId xmlns:a16="http://schemas.microsoft.com/office/drawing/2014/main" id="{8BB3A0D6-8EC3-4D86-206E-DD4D9CFA3EA5}"/>
+              </a:ext>
+            </a:extLst>
+          </p:cNvPr>
+          <p:cNvCxnSpPr>
+            <a:cxnSpLocks/>
+            <a:stCxn id="13" idx="0"/>
+            <a:endCxn id="9" idx="2"/>
+          </p:cNvCxnSpPr>
+          <p:nvPr/>
+        </p:nvCxnSpPr>
+        <p:spPr>
+          <a:xfrm flipV="1">
+            <a:off x="1392836" y="3930912"/>
+            <a:ext cx="805097" cy="654989"/>
+          </a:xfrm>
+          <a:prstGeom prst="line">
+            <a:avLst/>
+          </a:prstGeom>
+          <a:ln>
+            <a:headEnd type="none" w="med" len="med"/>
+            <a:tailEnd type="arrow" w="med" len="med"/>
+          </a:ln>
+        </p:spPr>
+        <p:style>
+          <a:lnRef idx="3">
+            <a:schemeClr val="accent2"/>
+          </a:lnRef>
+          <a:fillRef idx="0">
+            <a:schemeClr val="accent2"/>
+          </a:fillRef>
+          <a:effectRef idx="2">
+            <a:schemeClr val="accent2"/>
+          </a:effectRef>
+          <a:fontRef idx="minor">
+            <a:schemeClr val="tx1"/>
+          </a:fontRef>
+        </p:style>
+      </p:cxnSp>
+      <p:cxnSp>
+        <p:nvCxnSpPr>
+          <p:cNvPr id="18" name="Straight Connector 17">
+            <a:extLst>
+              <a:ext uri="{FF2B5EF4-FFF2-40B4-BE49-F238E27FC236}">
+                <a16:creationId xmlns:a16="http://schemas.microsoft.com/office/drawing/2014/main" id="{4F66D4B2-6CF9-7374-7526-3404224DBCE7}"/>
+              </a:ext>
+            </a:extLst>
+          </p:cNvPr>
+          <p:cNvCxnSpPr>
+            <a:cxnSpLocks/>
+            <a:stCxn id="11" idx="0"/>
+            <a:endCxn id="9" idx="2"/>
+          </p:cNvCxnSpPr>
+          <p:nvPr/>
+        </p:nvCxnSpPr>
+        <p:spPr>
+          <a:xfrm flipH="1" flipV="1">
+            <a:off x="2197933" y="3930912"/>
+            <a:ext cx="579619" cy="654988"/>
+          </a:xfrm>
+          <a:prstGeom prst="line">
+            <a:avLst/>
+          </a:prstGeom>
+          <a:ln>
+            <a:headEnd type="none" w="med" len="med"/>
+            <a:tailEnd type="arrow" w="med" len="med"/>
+          </a:ln>
+        </p:spPr>
+        <p:style>
+          <a:lnRef idx="3">
+            <a:schemeClr val="accent2"/>
+          </a:lnRef>
+          <a:fillRef idx="0">
+            <a:schemeClr val="accent2"/>
+          </a:fillRef>
+          <a:effectRef idx="2">
+            <a:schemeClr val="accent2"/>
+          </a:effectRef>
+          <a:fontRef idx="minor">
+            <a:schemeClr val="tx1"/>
+          </a:fontRef>
+        </p:style>
+      </p:cxnSp>
+      <p:sp>
+        <p:nvSpPr>
+          <p:cNvPr id="19" name="Rectangle 18">
+            <a:extLst>
+              <a:ext uri="{FF2B5EF4-FFF2-40B4-BE49-F238E27FC236}">
+                <a16:creationId xmlns:a16="http://schemas.microsoft.com/office/drawing/2014/main" id="{FEBE364E-36CD-FB8A-9F3F-BFB1E71C5F6A}"/>
+              </a:ext>
+            </a:extLst>
+          </p:cNvPr>
+          <p:cNvSpPr/>
+          <p:nvPr/>
+        </p:nvSpPr>
+        <p:spPr>
+          <a:xfrm>
+            <a:off x="2222916" y="5720573"/>
+            <a:ext cx="1109272" cy="479685"/>
+          </a:xfrm>
+          <a:prstGeom prst="rect">
+            <a:avLst/>
+          </a:prstGeom>
+        </p:spPr>
+        <p:style>
+          <a:lnRef idx="2">
+            <a:schemeClr val="accent1">
+              <a:shade val="50000"/>
+            </a:schemeClr>
+          </a:lnRef>
+          <a:fillRef idx="1">
+            <a:schemeClr val="accent1"/>
+          </a:fillRef>
+          <a:effectRef idx="0">
+            <a:schemeClr val="accent1"/>
+          </a:effectRef>
+          <a:fontRef idx="minor">
+            <a:schemeClr val="lt1"/>
+          </a:fontRef>
+        </p:style>
+        <p:txBody>
+          <a:bodyPr rtlCol="0" anchor="ctr"/>
+          <a:lstStyle/>
+          <a:p>
+            <a:pPr algn="ctr"/>
+            <a:r>
+              <a:rPr lang="en-NO" b="1" dirty="0">
+                <a:solidFill>
+                  <a:schemeClr val="accent3"/>
+                </a:solidFill>
+              </a:rPr>
+              <a:t>E</a:t>
+            </a:r>
+            <a:r>
+              <a:rPr lang="en-NO" dirty="0"/>
+              <a:t>rik</a:t>
+            </a:r>
+          </a:p>
+        </p:txBody>
+      </p:sp>
+      <p:cxnSp>
+        <p:nvCxnSpPr>
+          <p:cNvPr id="20" name="Straight Connector 19">
+            <a:extLst>
+              <a:ext uri="{FF2B5EF4-FFF2-40B4-BE49-F238E27FC236}">
+                <a16:creationId xmlns:a16="http://schemas.microsoft.com/office/drawing/2014/main" id="{D02303D3-FCD5-32BD-F6D8-D53ACD3FDDA8}"/>
+              </a:ext>
+            </a:extLst>
+          </p:cNvPr>
+          <p:cNvCxnSpPr>
+            <a:cxnSpLocks/>
+            <a:stCxn id="12" idx="1"/>
+            <a:endCxn id="11" idx="3"/>
+          </p:cNvCxnSpPr>
+          <p:nvPr/>
+        </p:nvCxnSpPr>
+        <p:spPr>
+          <a:xfrm flipH="1" flipV="1">
+            <a:off x="3332188" y="4825743"/>
+            <a:ext cx="510916" cy="4084"/>
+          </a:xfrm>
+          <a:prstGeom prst="line">
+            <a:avLst/>
+          </a:prstGeom>
+          <a:ln>
+            <a:headEnd type="none" w="med" len="med"/>
+            <a:tailEnd type="arrow" w="med" len="med"/>
+          </a:ln>
+        </p:spPr>
+        <p:style>
+          <a:lnRef idx="3">
+            <a:schemeClr val="accent2"/>
+          </a:lnRef>
+          <a:fillRef idx="0">
+            <a:schemeClr val="accent2"/>
+          </a:fillRef>
+          <a:effectRef idx="2">
+            <a:schemeClr val="accent2"/>
+          </a:effectRef>
+          <a:fontRef idx="minor">
+            <a:schemeClr val="tx1"/>
+          </a:fontRef>
+        </p:style>
+      </p:cxnSp>
+      <p:cxnSp>
+        <p:nvCxnSpPr>
+          <p:cNvPr id="21" name="Straight Connector 20">
+            <a:extLst>
+              <a:ext uri="{FF2B5EF4-FFF2-40B4-BE49-F238E27FC236}">
+                <a16:creationId xmlns:a16="http://schemas.microsoft.com/office/drawing/2014/main" id="{B6A14EBC-B035-9114-782E-97EAEE7B8EFB}"/>
+              </a:ext>
+            </a:extLst>
+          </p:cNvPr>
+          <p:cNvCxnSpPr>
+            <a:cxnSpLocks/>
+            <a:stCxn id="19" idx="0"/>
+            <a:endCxn id="11" idx="2"/>
+          </p:cNvCxnSpPr>
+          <p:nvPr/>
+        </p:nvCxnSpPr>
+        <p:spPr>
+          <a:xfrm flipV="1">
+            <a:off x="2777552" y="5065585"/>
+            <a:ext cx="0" cy="654988"/>
+          </a:xfrm>
+          <a:prstGeom prst="line">
+            <a:avLst/>
+          </a:prstGeom>
+          <a:ln>
+            <a:headEnd type="none" w="med" len="med"/>
+            <a:tailEnd type="arrow" w="med" len="med"/>
+          </a:ln>
+        </p:spPr>
+        <p:style>
+          <a:lnRef idx="3">
+            <a:schemeClr val="accent2"/>
+          </a:lnRef>
+          <a:fillRef idx="0">
+            <a:schemeClr val="accent2"/>
+          </a:fillRef>
+          <a:effectRef idx="2">
+            <a:schemeClr val="accent2"/>
+          </a:effectRef>
+          <a:fontRef idx="minor">
+            <a:schemeClr val="tx1"/>
+          </a:fontRef>
+        </p:style>
+      </p:cxnSp>
+      <p:cxnSp>
+        <p:nvCxnSpPr>
+          <p:cNvPr id="22" name="Straight Connector 21">
+            <a:extLst>
+              <a:ext uri="{FF2B5EF4-FFF2-40B4-BE49-F238E27FC236}">
+                <a16:creationId xmlns:a16="http://schemas.microsoft.com/office/drawing/2014/main" id="{C915AE66-10B1-8AF6-A20B-3E8AE5CC537E}"/>
+              </a:ext>
+            </a:extLst>
+          </p:cNvPr>
+          <p:cNvCxnSpPr>
+            <a:cxnSpLocks/>
+            <a:endCxn id="8" idx="3"/>
+          </p:cNvCxnSpPr>
+          <p:nvPr/>
+        </p:nvCxnSpPr>
+        <p:spPr>
+          <a:xfrm flipH="1">
+            <a:off x="4952376" y="3668843"/>
+            <a:ext cx="719528" cy="1"/>
+          </a:xfrm>
+          <a:prstGeom prst="line">
+            <a:avLst/>
+          </a:prstGeom>
+          <a:ln>
+            <a:headEnd type="none" w="med" len="med"/>
+            <a:tailEnd type="arrow" w="med" len="med"/>
+          </a:ln>
+        </p:spPr>
+        <p:style>
+          <a:lnRef idx="3">
+            <a:schemeClr val="accent2"/>
+          </a:lnRef>
+          <a:fillRef idx="0">
+            <a:schemeClr val="accent2"/>
+          </a:fillRef>
+          <a:effectRef idx="2">
+            <a:schemeClr val="accent2"/>
+          </a:effectRef>
+          <a:fontRef idx="minor">
+            <a:schemeClr val="tx1"/>
+          </a:fontRef>
+        </p:style>
+      </p:cxnSp>
+      <p:cxnSp>
+        <p:nvCxnSpPr>
+          <p:cNvPr id="23" name="Straight Connector 22">
+            <a:extLst>
+              <a:ext uri="{FF2B5EF4-FFF2-40B4-BE49-F238E27FC236}">
+                <a16:creationId xmlns:a16="http://schemas.microsoft.com/office/drawing/2014/main" id="{02E901BB-72EF-5741-5169-4A801A6E72E1}"/>
+              </a:ext>
+            </a:extLst>
+          </p:cNvPr>
+          <p:cNvCxnSpPr>
+            <a:cxnSpLocks/>
+            <a:stCxn id="12" idx="0"/>
+            <a:endCxn id="8" idx="2"/>
+          </p:cNvCxnSpPr>
+          <p:nvPr/>
+        </p:nvCxnSpPr>
+        <p:spPr>
+          <a:xfrm flipV="1">
+            <a:off x="4397740" y="3908686"/>
+            <a:ext cx="0" cy="681298"/>
+          </a:xfrm>
+          <a:prstGeom prst="line">
+            <a:avLst/>
+          </a:prstGeom>
+          <a:ln>
+            <a:headEnd type="none" w="med" len="med"/>
+            <a:tailEnd type="arrow" w="med" len="med"/>
+          </a:ln>
+        </p:spPr>
+        <p:style>
+          <a:lnRef idx="3">
+            <a:schemeClr val="accent2"/>
+          </a:lnRef>
+          <a:fillRef idx="0">
+            <a:schemeClr val="accent2"/>
+          </a:fillRef>
+          <a:effectRef idx="2">
+            <a:schemeClr val="accent2"/>
+          </a:effectRef>
+          <a:fontRef idx="minor">
+            <a:schemeClr val="tx1"/>
+          </a:fontRef>
+        </p:style>
+      </p:cxnSp>
+      <p:sp>
+        <p:nvSpPr>
+          <p:cNvPr id="24" name="Rectangle 23">
+            <a:extLst>
+              <a:ext uri="{FF2B5EF4-FFF2-40B4-BE49-F238E27FC236}">
+                <a16:creationId xmlns:a16="http://schemas.microsoft.com/office/drawing/2014/main" id="{7479D9C5-8B01-7EB8-D002-8F35E9CCF704}"/>
+              </a:ext>
+            </a:extLst>
+          </p:cNvPr>
+          <p:cNvSpPr/>
+          <p:nvPr/>
+        </p:nvSpPr>
+        <p:spPr>
+          <a:xfrm>
+            <a:off x="8458381" y="568050"/>
+            <a:ext cx="629586" cy="424898"/>
+          </a:xfrm>
+          <a:prstGeom prst="rect">
+            <a:avLst/>
+          </a:prstGeom>
+        </p:spPr>
+        <p:style>
+          <a:lnRef idx="2">
+            <a:schemeClr val="accent1">
+              <a:shade val="50000"/>
+            </a:schemeClr>
+          </a:lnRef>
+          <a:fillRef idx="1">
+            <a:schemeClr val="accent1"/>
+          </a:fillRef>
+          <a:effectRef idx="0">
+            <a:schemeClr val="accent1"/>
+          </a:effectRef>
+          <a:fontRef idx="minor">
+            <a:schemeClr val="lt1"/>
+          </a:fontRef>
+        </p:style>
+        <p:txBody>
+          <a:bodyPr rtlCol="0" anchor="ctr"/>
+          <a:lstStyle/>
+          <a:p>
+            <a:pPr algn="ctr"/>
+            <a:r>
+              <a:rPr lang="en-NO" dirty="0"/>
+              <a:t>J</a:t>
+            </a:r>
+          </a:p>
+        </p:txBody>
+      </p:sp>
+      <p:sp>
+        <p:nvSpPr>
+          <p:cNvPr id="25" name="Rectangle 24">
+            <a:extLst>
+              <a:ext uri="{FF2B5EF4-FFF2-40B4-BE49-F238E27FC236}">
+                <a16:creationId xmlns:a16="http://schemas.microsoft.com/office/drawing/2014/main" id="{226771F4-CC94-F886-0EF5-AAF7DE299F87}"/>
+              </a:ext>
+            </a:extLst>
+          </p:cNvPr>
+          <p:cNvSpPr/>
+          <p:nvPr/>
+        </p:nvSpPr>
+        <p:spPr>
+          <a:xfrm>
+            <a:off x="9275799" y="568050"/>
+            <a:ext cx="629586" cy="424898"/>
+          </a:xfrm>
+          <a:prstGeom prst="rect">
+            <a:avLst/>
+          </a:prstGeom>
+        </p:spPr>
+        <p:style>
+          <a:lnRef idx="2">
+            <a:schemeClr val="accent1">
+              <a:shade val="50000"/>
+            </a:schemeClr>
+          </a:lnRef>
+          <a:fillRef idx="1">
+            <a:schemeClr val="accent1"/>
+          </a:fillRef>
+          <a:effectRef idx="0">
+            <a:schemeClr val="accent1"/>
+          </a:effectRef>
+          <a:fontRef idx="minor">
+            <a:schemeClr val="lt1"/>
+          </a:fontRef>
+        </p:style>
+        <p:txBody>
+          <a:bodyPr rtlCol="0" anchor="ctr"/>
+          <a:lstStyle/>
+          <a:p>
+            <a:pPr algn="ctr"/>
+            <a:r>
+              <a:rPr lang="en-NO" dirty="0"/>
+              <a:t>L</a:t>
+            </a:r>
+          </a:p>
+        </p:txBody>
+      </p:sp>
+      <p:sp>
+        <p:nvSpPr>
+          <p:cNvPr id="26" name="Rectangle 25">
+            <a:extLst>
+              <a:ext uri="{FF2B5EF4-FFF2-40B4-BE49-F238E27FC236}">
+                <a16:creationId xmlns:a16="http://schemas.microsoft.com/office/drawing/2014/main" id="{73DA9173-D21F-3DA9-0212-8A3E6701DF9E}"/>
+              </a:ext>
+            </a:extLst>
+          </p:cNvPr>
+          <p:cNvSpPr/>
+          <p:nvPr/>
+        </p:nvSpPr>
+        <p:spPr>
+          <a:xfrm>
+            <a:off x="8458381" y="1264722"/>
+            <a:ext cx="629586" cy="424898"/>
+          </a:xfrm>
+          <a:prstGeom prst="rect">
+            <a:avLst/>
+          </a:prstGeom>
+        </p:spPr>
+        <p:style>
+          <a:lnRef idx="2">
+            <a:schemeClr val="accent1">
+              <a:shade val="50000"/>
+            </a:schemeClr>
+          </a:lnRef>
+          <a:fillRef idx="1">
+            <a:schemeClr val="accent1"/>
+          </a:fillRef>
+          <a:effectRef idx="0">
+            <a:schemeClr val="accent1"/>
+          </a:effectRef>
+          <a:fontRef idx="minor">
+            <a:schemeClr val="lt1"/>
+          </a:fontRef>
+        </p:style>
+        <p:txBody>
+          <a:bodyPr rtlCol="0" anchor="ctr"/>
+          <a:lstStyle/>
+          <a:p>
+            <a:pPr algn="ctr"/>
+            <a:r>
+              <a:rPr lang="en-NO" dirty="0"/>
+              <a:t>F</a:t>
+            </a:r>
+          </a:p>
+        </p:txBody>
+      </p:sp>
+      <p:sp>
+        <p:nvSpPr>
+          <p:cNvPr id="27" name="Rectangle 26">
+            <a:extLst>
+              <a:ext uri="{FF2B5EF4-FFF2-40B4-BE49-F238E27FC236}">
+                <a16:creationId xmlns:a16="http://schemas.microsoft.com/office/drawing/2014/main" id="{9BCF9A02-B316-51D8-9E69-5E429BF72662}"/>
+              </a:ext>
+            </a:extLst>
+          </p:cNvPr>
+          <p:cNvSpPr/>
+          <p:nvPr/>
+        </p:nvSpPr>
+        <p:spPr>
+          <a:xfrm>
+            <a:off x="9275799" y="1264722"/>
+            <a:ext cx="629586" cy="424898"/>
+          </a:xfrm>
+          <a:prstGeom prst="rect">
+            <a:avLst/>
+          </a:prstGeom>
+        </p:spPr>
+        <p:style>
+          <a:lnRef idx="2">
+            <a:schemeClr val="accent1">
+              <a:shade val="50000"/>
+            </a:schemeClr>
+          </a:lnRef>
+          <a:fillRef idx="1">
+            <a:schemeClr val="accent1"/>
+          </a:fillRef>
+          <a:effectRef idx="0">
+            <a:schemeClr val="accent1"/>
+          </a:effectRef>
+          <a:fontRef idx="minor">
+            <a:schemeClr val="lt1"/>
+          </a:fontRef>
+        </p:style>
+        <p:txBody>
+          <a:bodyPr rtlCol="0" anchor="ctr"/>
+          <a:lstStyle/>
+          <a:p>
+            <a:pPr algn="ctr"/>
+            <a:r>
+              <a:rPr lang="en-NO" dirty="0"/>
+              <a:t>L</a:t>
+            </a:r>
+          </a:p>
+        </p:txBody>
+      </p:sp>
+      <p:sp>
+        <p:nvSpPr>
+          <p:cNvPr id="28" name="Rectangle 27">
+            <a:extLst>
+              <a:ext uri="{FF2B5EF4-FFF2-40B4-BE49-F238E27FC236}">
+                <a16:creationId xmlns:a16="http://schemas.microsoft.com/office/drawing/2014/main" id="{2331726B-A43E-C6D9-C916-AB04907EF1DA}"/>
+              </a:ext>
+            </a:extLst>
+          </p:cNvPr>
+          <p:cNvSpPr/>
+          <p:nvPr/>
+        </p:nvSpPr>
+        <p:spPr>
+          <a:xfrm>
+            <a:off x="8458381" y="1961394"/>
+            <a:ext cx="629586" cy="424898"/>
+          </a:xfrm>
+          <a:prstGeom prst="rect">
+            <a:avLst/>
+          </a:prstGeom>
+        </p:spPr>
+        <p:style>
+          <a:lnRef idx="2">
+            <a:schemeClr val="accent1">
+              <a:shade val="50000"/>
+            </a:schemeClr>
+          </a:lnRef>
+          <a:fillRef idx="1">
+            <a:schemeClr val="accent1"/>
+          </a:fillRef>
+          <a:effectRef idx="0">
+            <a:schemeClr val="accent1"/>
+          </a:effectRef>
+          <a:fontRef idx="minor">
+            <a:schemeClr val="lt1"/>
+          </a:fontRef>
+        </p:style>
+        <p:txBody>
+          <a:bodyPr rtlCol="0" anchor="ctr"/>
+          <a:lstStyle/>
+          <a:p>
+            <a:pPr algn="ctr"/>
+            <a:r>
+              <a:rPr lang="en-NO" dirty="0"/>
+              <a:t>J</a:t>
+            </a:r>
+          </a:p>
+        </p:txBody>
+      </p:sp>
+      <p:sp>
+        <p:nvSpPr>
+          <p:cNvPr id="29" name="Rectangle 28">
+            <a:extLst>
+              <a:ext uri="{FF2B5EF4-FFF2-40B4-BE49-F238E27FC236}">
+                <a16:creationId xmlns:a16="http://schemas.microsoft.com/office/drawing/2014/main" id="{EE42986D-0C48-6049-DAA7-49469906290A}"/>
+              </a:ext>
+            </a:extLst>
+          </p:cNvPr>
+          <p:cNvSpPr/>
+          <p:nvPr/>
+        </p:nvSpPr>
+        <p:spPr>
+          <a:xfrm>
+            <a:off x="9275799" y="1961394"/>
+            <a:ext cx="629586" cy="424898"/>
+          </a:xfrm>
+          <a:prstGeom prst="rect">
+            <a:avLst/>
+          </a:prstGeom>
+        </p:spPr>
+        <p:style>
+          <a:lnRef idx="2">
+            <a:schemeClr val="accent1">
+              <a:shade val="50000"/>
+            </a:schemeClr>
+          </a:lnRef>
+          <a:fillRef idx="1">
+            <a:schemeClr val="accent1"/>
+          </a:fillRef>
+          <a:effectRef idx="0">
+            <a:schemeClr val="accent1"/>
+          </a:effectRef>
+          <a:fontRef idx="minor">
+            <a:schemeClr val="lt1"/>
+          </a:fontRef>
+        </p:style>
+        <p:txBody>
+          <a:bodyPr rtlCol="0" anchor="ctr"/>
+          <a:lstStyle/>
+          <a:p>
+            <a:pPr algn="ctr"/>
+            <a:r>
+              <a:rPr lang="en-NO" dirty="0"/>
+              <a:t>M</a:t>
+            </a:r>
+          </a:p>
+        </p:txBody>
+      </p:sp>
+      <p:sp>
+        <p:nvSpPr>
+          <p:cNvPr id="30" name="Rectangle 29">
+            <a:extLst>
+              <a:ext uri="{FF2B5EF4-FFF2-40B4-BE49-F238E27FC236}">
+                <a16:creationId xmlns:a16="http://schemas.microsoft.com/office/drawing/2014/main" id="{D907FE94-3665-97FD-F49A-9112355DBEFF}"/>
+              </a:ext>
+            </a:extLst>
+          </p:cNvPr>
+          <p:cNvSpPr/>
+          <p:nvPr/>
+        </p:nvSpPr>
+        <p:spPr>
+          <a:xfrm>
+            <a:off x="5671904" y="3429000"/>
+            <a:ext cx="1109272" cy="479685"/>
+          </a:xfrm>
+          <a:prstGeom prst="rect">
+            <a:avLst/>
+          </a:prstGeom>
+        </p:spPr>
+        <p:style>
+          <a:lnRef idx="2">
+            <a:schemeClr val="accent1">
+              <a:shade val="50000"/>
+            </a:schemeClr>
+          </a:lnRef>
+          <a:fillRef idx="1">
+            <a:schemeClr val="accent1"/>
+          </a:fillRef>
+          <a:effectRef idx="0">
+            <a:schemeClr val="accent1"/>
+          </a:effectRef>
+          <a:fontRef idx="minor">
+            <a:schemeClr val="lt1"/>
+          </a:fontRef>
+        </p:style>
+        <p:txBody>
+          <a:bodyPr rtlCol="0" anchor="ctr"/>
+          <a:lstStyle/>
+          <a:p>
+            <a:pPr algn="ctr"/>
+            <a:r>
+              <a:rPr lang="en-NO" b="1" dirty="0">
+                <a:solidFill>
+                  <a:schemeClr val="accent3"/>
+                </a:solidFill>
+              </a:rPr>
+              <a:t>T</a:t>
+            </a:r>
+            <a:r>
+              <a:rPr lang="en-NO" dirty="0"/>
+              <a:t>homas</a:t>
+            </a:r>
+          </a:p>
+        </p:txBody>
+      </p:sp>
+      <p:sp>
+        <p:nvSpPr>
+          <p:cNvPr id="31" name="Rectangle 30">
+            <a:extLst>
+              <a:ext uri="{FF2B5EF4-FFF2-40B4-BE49-F238E27FC236}">
+                <a16:creationId xmlns:a16="http://schemas.microsoft.com/office/drawing/2014/main" id="{ADF50527-5FB3-E8F2-89A7-8180E8E75EA7}"/>
+              </a:ext>
+            </a:extLst>
+          </p:cNvPr>
+          <p:cNvSpPr/>
+          <p:nvPr/>
+        </p:nvSpPr>
+        <p:spPr>
+          <a:xfrm>
+            <a:off x="8458381" y="2643442"/>
+            <a:ext cx="629586" cy="424898"/>
+          </a:xfrm>
+          <a:prstGeom prst="rect">
+            <a:avLst/>
+          </a:prstGeom>
+        </p:spPr>
+        <p:style>
+          <a:lnRef idx="2">
+            <a:schemeClr val="accent1">
+              <a:shade val="50000"/>
+            </a:schemeClr>
+          </a:lnRef>
+          <a:fillRef idx="1">
+            <a:schemeClr val="accent1"/>
+          </a:fillRef>
+          <a:effectRef idx="0">
+            <a:schemeClr val="accent1"/>
+          </a:effectRef>
+          <a:fontRef idx="minor">
+            <a:schemeClr val="lt1"/>
+          </a:fontRef>
+        </p:style>
+        <p:txBody>
+          <a:bodyPr rtlCol="0" anchor="ctr"/>
+          <a:lstStyle/>
+          <a:p>
+            <a:pPr algn="ctr"/>
+            <a:r>
+              <a:rPr lang="en-NO" dirty="0"/>
+              <a:t>T</a:t>
+            </a:r>
+          </a:p>
+        </p:txBody>
+      </p:sp>
+      <p:sp>
+        <p:nvSpPr>
+          <p:cNvPr id="32" name="Rectangle 31">
+            <a:extLst>
+              <a:ext uri="{FF2B5EF4-FFF2-40B4-BE49-F238E27FC236}">
+                <a16:creationId xmlns:a16="http://schemas.microsoft.com/office/drawing/2014/main" id="{BA34266F-010C-C5EE-04A9-BA7D3A8EC602}"/>
+              </a:ext>
+            </a:extLst>
+          </p:cNvPr>
+          <p:cNvSpPr/>
+          <p:nvPr/>
+        </p:nvSpPr>
+        <p:spPr>
+          <a:xfrm>
+            <a:off x="9275799" y="2643442"/>
+            <a:ext cx="629586" cy="424898"/>
+          </a:xfrm>
+          <a:prstGeom prst="rect">
+            <a:avLst/>
+          </a:prstGeom>
+        </p:spPr>
+        <p:style>
+          <a:lnRef idx="2">
+            <a:schemeClr val="accent1">
+              <a:shade val="50000"/>
+            </a:schemeClr>
+          </a:lnRef>
+          <a:fillRef idx="1">
+            <a:schemeClr val="accent1"/>
+          </a:fillRef>
+          <a:effectRef idx="0">
+            <a:schemeClr val="accent1"/>
+          </a:effectRef>
+          <a:fontRef idx="minor">
+            <a:schemeClr val="lt1"/>
+          </a:fontRef>
+        </p:style>
+        <p:txBody>
+          <a:bodyPr rtlCol="0" anchor="ctr"/>
+          <a:lstStyle/>
+          <a:p>
+            <a:pPr algn="ctr"/>
+            <a:r>
+              <a:rPr lang="en-NO" dirty="0"/>
+              <a:t>F</a:t>
+            </a:r>
+          </a:p>
+        </p:txBody>
+      </p:sp>
+      <p:sp>
+        <p:nvSpPr>
+          <p:cNvPr id="33" name="Rectangle 32">
+            <a:extLst>
+              <a:ext uri="{FF2B5EF4-FFF2-40B4-BE49-F238E27FC236}">
+                <a16:creationId xmlns:a16="http://schemas.microsoft.com/office/drawing/2014/main" id="{8250BEBA-CC84-451E-617C-DB2CFEA0A747}"/>
+              </a:ext>
+            </a:extLst>
+          </p:cNvPr>
+          <p:cNvSpPr/>
+          <p:nvPr/>
+        </p:nvSpPr>
+        <p:spPr>
+          <a:xfrm>
+            <a:off x="8458381" y="3325490"/>
+            <a:ext cx="629586" cy="424898"/>
+          </a:xfrm>
+          <a:prstGeom prst="rect">
+            <a:avLst/>
+          </a:prstGeom>
+        </p:spPr>
+        <p:style>
+          <a:lnRef idx="2">
+            <a:schemeClr val="accent1">
+              <a:shade val="50000"/>
+            </a:schemeClr>
+          </a:lnRef>
+          <a:fillRef idx="1">
+            <a:schemeClr val="accent1"/>
+          </a:fillRef>
+          <a:effectRef idx="0">
+            <a:schemeClr val="accent1"/>
+          </a:effectRef>
+          <a:fontRef idx="minor">
+            <a:schemeClr val="lt1"/>
+          </a:fontRef>
+        </p:style>
+        <p:txBody>
+          <a:bodyPr rtlCol="0" anchor="ctr"/>
+          <a:lstStyle/>
+          <a:p>
+            <a:pPr algn="ctr"/>
+            <a:r>
+              <a:rPr lang="en-NO" dirty="0"/>
+              <a:t>D</a:t>
+            </a:r>
+          </a:p>
+        </p:txBody>
+      </p:sp>
+      <p:sp>
+        <p:nvSpPr>
+          <p:cNvPr id="34" name="Rectangle 33">
+            <a:extLst>
+              <a:ext uri="{FF2B5EF4-FFF2-40B4-BE49-F238E27FC236}">
+                <a16:creationId xmlns:a16="http://schemas.microsoft.com/office/drawing/2014/main" id="{B029E6A5-FEE1-041F-3D52-B93859559B5E}"/>
+              </a:ext>
+            </a:extLst>
+          </p:cNvPr>
+          <p:cNvSpPr/>
+          <p:nvPr/>
+        </p:nvSpPr>
+        <p:spPr>
+          <a:xfrm>
+            <a:off x="9275799" y="3325490"/>
+            <a:ext cx="629586" cy="424898"/>
+          </a:xfrm>
+          <a:prstGeom prst="rect">
+            <a:avLst/>
+          </a:prstGeom>
+        </p:spPr>
+        <p:style>
+          <a:lnRef idx="2">
+            <a:schemeClr val="accent1">
+              <a:shade val="50000"/>
+            </a:schemeClr>
+          </a:lnRef>
+          <a:fillRef idx="1">
+            <a:schemeClr val="accent1"/>
+          </a:fillRef>
+          <a:effectRef idx="0">
+            <a:schemeClr val="accent1"/>
+          </a:effectRef>
+          <a:fontRef idx="minor">
+            <a:schemeClr val="lt1"/>
+          </a:fontRef>
+        </p:style>
+        <p:txBody>
+          <a:bodyPr rtlCol="0" anchor="ctr"/>
+          <a:lstStyle/>
+          <a:p>
+            <a:pPr algn="ctr"/>
+            <a:r>
+              <a:rPr lang="en-NO" dirty="0"/>
+              <a:t>F</a:t>
+            </a:r>
+          </a:p>
+        </p:txBody>
+      </p:sp>
+      <p:sp>
+        <p:nvSpPr>
+          <p:cNvPr id="35" name="Rectangle 34">
+            <a:extLst>
+              <a:ext uri="{FF2B5EF4-FFF2-40B4-BE49-F238E27FC236}">
+                <a16:creationId xmlns:a16="http://schemas.microsoft.com/office/drawing/2014/main" id="{A699F58C-E34F-FE6F-D81B-52802AF791A9}"/>
+              </a:ext>
+            </a:extLst>
+          </p:cNvPr>
+          <p:cNvSpPr/>
+          <p:nvPr/>
+        </p:nvSpPr>
+        <p:spPr>
+          <a:xfrm>
+            <a:off x="8458381" y="4007538"/>
+            <a:ext cx="629586" cy="424898"/>
+          </a:xfrm>
+          <a:prstGeom prst="rect">
+            <a:avLst/>
+          </a:prstGeom>
+        </p:spPr>
+        <p:style>
+          <a:lnRef idx="2">
+            <a:schemeClr val="accent1">
+              <a:shade val="50000"/>
+            </a:schemeClr>
+          </a:lnRef>
+          <a:fillRef idx="1">
+            <a:schemeClr val="accent1"/>
+          </a:fillRef>
+          <a:effectRef idx="0">
+            <a:schemeClr val="accent1"/>
+          </a:effectRef>
+          <a:fontRef idx="minor">
+            <a:schemeClr val="lt1"/>
+          </a:fontRef>
+        </p:style>
+        <p:txBody>
+          <a:bodyPr rtlCol="0" anchor="ctr"/>
+          <a:lstStyle/>
+          <a:p>
+            <a:pPr algn="ctr"/>
+            <a:r>
+              <a:rPr lang="en-NO" dirty="0"/>
+              <a:t>D</a:t>
+            </a:r>
+          </a:p>
+        </p:txBody>
+      </p:sp>
+      <p:sp>
+        <p:nvSpPr>
+          <p:cNvPr id="36" name="Rectangle 35">
+            <a:extLst>
+              <a:ext uri="{FF2B5EF4-FFF2-40B4-BE49-F238E27FC236}">
+                <a16:creationId xmlns:a16="http://schemas.microsoft.com/office/drawing/2014/main" id="{62D9B3AB-D2ED-A7EC-FC90-D3851D5750B3}"/>
+              </a:ext>
+            </a:extLst>
+          </p:cNvPr>
+          <p:cNvSpPr/>
+          <p:nvPr/>
+        </p:nvSpPr>
+        <p:spPr>
+          <a:xfrm>
+            <a:off x="9275799" y="4007538"/>
+            <a:ext cx="629586" cy="424898"/>
+          </a:xfrm>
+          <a:prstGeom prst="rect">
+            <a:avLst/>
+          </a:prstGeom>
+        </p:spPr>
+        <p:style>
+          <a:lnRef idx="2">
+            <a:schemeClr val="accent1">
+              <a:shade val="50000"/>
+            </a:schemeClr>
+          </a:lnRef>
+          <a:fillRef idx="1">
+            <a:schemeClr val="accent1"/>
+          </a:fillRef>
+          <a:effectRef idx="0">
+            <a:schemeClr val="accent1"/>
+          </a:effectRef>
+          <a:fontRef idx="minor">
+            <a:schemeClr val="lt1"/>
+          </a:fontRef>
+        </p:style>
+        <p:txBody>
+          <a:bodyPr rtlCol="0" anchor="ctr"/>
+          <a:lstStyle/>
+          <a:p>
+            <a:pPr algn="ctr"/>
+            <a:r>
+              <a:rPr lang="en-NO" dirty="0"/>
+              <a:t>O</a:t>
+            </a:r>
+          </a:p>
+        </p:txBody>
+      </p:sp>
+      <p:sp>
+        <p:nvSpPr>
+          <p:cNvPr id="37" name="Rectangle 36">
+            <a:extLst>
+              <a:ext uri="{FF2B5EF4-FFF2-40B4-BE49-F238E27FC236}">
+                <a16:creationId xmlns:a16="http://schemas.microsoft.com/office/drawing/2014/main" id="{D4DF7103-B31A-CC84-E1BA-1E7081DE642B}"/>
+              </a:ext>
+            </a:extLst>
+          </p:cNvPr>
+          <p:cNvSpPr/>
+          <p:nvPr/>
+        </p:nvSpPr>
+        <p:spPr>
+          <a:xfrm>
+            <a:off x="8458381" y="4680651"/>
+            <a:ext cx="629586" cy="424898"/>
+          </a:xfrm>
+          <a:prstGeom prst="rect">
+            <a:avLst/>
+          </a:prstGeom>
+        </p:spPr>
+        <p:style>
+          <a:lnRef idx="2">
+            <a:schemeClr val="accent1">
+              <a:shade val="50000"/>
+            </a:schemeClr>
+          </a:lnRef>
+          <a:fillRef idx="1">
+            <a:schemeClr val="accent1"/>
+          </a:fillRef>
+          <a:effectRef idx="0">
+            <a:schemeClr val="accent1"/>
+          </a:effectRef>
+          <a:fontRef idx="minor">
+            <a:schemeClr val="lt1"/>
+          </a:fontRef>
+        </p:style>
+        <p:txBody>
+          <a:bodyPr rtlCol="0" anchor="ctr"/>
+          <a:lstStyle/>
+          <a:p>
+            <a:pPr algn="ctr"/>
+            <a:r>
+              <a:rPr lang="en-NO" dirty="0"/>
+              <a:t>O</a:t>
+            </a:r>
+          </a:p>
+        </p:txBody>
+      </p:sp>
+      <p:sp>
+        <p:nvSpPr>
+          <p:cNvPr id="38" name="Rectangle 37">
+            <a:extLst>
+              <a:ext uri="{FF2B5EF4-FFF2-40B4-BE49-F238E27FC236}">
+                <a16:creationId xmlns:a16="http://schemas.microsoft.com/office/drawing/2014/main" id="{049F043D-20A1-AE3C-8ABB-B95C25966328}"/>
+              </a:ext>
+            </a:extLst>
+          </p:cNvPr>
+          <p:cNvSpPr/>
+          <p:nvPr/>
+        </p:nvSpPr>
+        <p:spPr>
+          <a:xfrm>
+            <a:off x="9275799" y="4680651"/>
+            <a:ext cx="629586" cy="424898"/>
+          </a:xfrm>
+          <a:prstGeom prst="rect">
+            <a:avLst/>
+          </a:prstGeom>
+        </p:spPr>
+        <p:style>
+          <a:lnRef idx="2">
+            <a:schemeClr val="accent1">
+              <a:shade val="50000"/>
+            </a:schemeClr>
+          </a:lnRef>
+          <a:fillRef idx="1">
+            <a:schemeClr val="accent1"/>
+          </a:fillRef>
+          <a:effectRef idx="0">
+            <a:schemeClr val="accent1"/>
+          </a:effectRef>
+          <a:fontRef idx="minor">
+            <a:schemeClr val="lt1"/>
+          </a:fontRef>
+        </p:style>
+        <p:txBody>
+          <a:bodyPr rtlCol="0" anchor="ctr"/>
+          <a:lstStyle/>
+          <a:p>
+            <a:pPr algn="ctr"/>
+            <a:r>
+              <a:rPr lang="en-NO" dirty="0"/>
+              <a:t>L</a:t>
+            </a:r>
+          </a:p>
+        </p:txBody>
+      </p:sp>
+      <p:sp>
+        <p:nvSpPr>
+          <p:cNvPr id="39" name="Rectangle 38">
+            <a:extLst>
+              <a:ext uri="{FF2B5EF4-FFF2-40B4-BE49-F238E27FC236}">
+                <a16:creationId xmlns:a16="http://schemas.microsoft.com/office/drawing/2014/main" id="{8A504FA3-B57E-954E-B54A-667DC959E294}"/>
+              </a:ext>
+            </a:extLst>
+          </p:cNvPr>
+          <p:cNvSpPr/>
+          <p:nvPr/>
+        </p:nvSpPr>
+        <p:spPr>
+          <a:xfrm>
+            <a:off x="8458381" y="5295675"/>
+            <a:ext cx="629586" cy="424898"/>
+          </a:xfrm>
+          <a:prstGeom prst="rect">
+            <a:avLst/>
+          </a:prstGeom>
+        </p:spPr>
+        <p:style>
+          <a:lnRef idx="2">
+            <a:schemeClr val="accent1">
+              <a:shade val="50000"/>
+            </a:schemeClr>
+          </a:lnRef>
+          <a:fillRef idx="1">
+            <a:schemeClr val="accent1"/>
+          </a:fillRef>
+          <a:effectRef idx="0">
+            <a:schemeClr val="accent1"/>
+          </a:effectRef>
+          <a:fontRef idx="minor">
+            <a:schemeClr val="lt1"/>
+          </a:fontRef>
+        </p:style>
+        <p:txBody>
+          <a:bodyPr rtlCol="0" anchor="ctr"/>
+          <a:lstStyle/>
+          <a:p>
+            <a:pPr algn="ctr"/>
+            <a:r>
+              <a:rPr lang="en-NO" dirty="0"/>
+              <a:t>P</a:t>
+            </a:r>
+          </a:p>
+        </p:txBody>
+      </p:sp>
+      <p:sp>
+        <p:nvSpPr>
+          <p:cNvPr id="40" name="Rectangle 39">
+            <a:extLst>
+              <a:ext uri="{FF2B5EF4-FFF2-40B4-BE49-F238E27FC236}">
+                <a16:creationId xmlns:a16="http://schemas.microsoft.com/office/drawing/2014/main" id="{EB9FACC8-FC67-D854-DFB8-C62E50934BBF}"/>
+              </a:ext>
+            </a:extLst>
+          </p:cNvPr>
+          <p:cNvSpPr/>
+          <p:nvPr/>
+        </p:nvSpPr>
+        <p:spPr>
+          <a:xfrm>
+            <a:off x="9275799" y="5295675"/>
+            <a:ext cx="629586" cy="424898"/>
+          </a:xfrm>
+          <a:prstGeom prst="rect">
+            <a:avLst/>
+          </a:prstGeom>
+        </p:spPr>
+        <p:style>
+          <a:lnRef idx="2">
+            <a:schemeClr val="accent1">
+              <a:shade val="50000"/>
+            </a:schemeClr>
+          </a:lnRef>
+          <a:fillRef idx="1">
+            <a:schemeClr val="accent1"/>
+          </a:fillRef>
+          <a:effectRef idx="0">
+            <a:schemeClr val="accent1"/>
+          </a:effectRef>
+          <a:fontRef idx="minor">
+            <a:schemeClr val="lt1"/>
+          </a:fontRef>
+        </p:style>
+        <p:txBody>
+          <a:bodyPr rtlCol="0" anchor="ctr"/>
+          <a:lstStyle/>
+          <a:p>
+            <a:pPr algn="ctr"/>
+            <a:r>
+              <a:rPr lang="en-NO" dirty="0"/>
+              <a:t>M</a:t>
+            </a:r>
+          </a:p>
+        </p:txBody>
+      </p:sp>
+      <p:sp>
+        <p:nvSpPr>
+          <p:cNvPr id="41" name="Rectangle 40">
+            <a:extLst>
+              <a:ext uri="{FF2B5EF4-FFF2-40B4-BE49-F238E27FC236}">
+                <a16:creationId xmlns:a16="http://schemas.microsoft.com/office/drawing/2014/main" id="{FC35B726-C29D-356F-5BA3-4056B61A6491}"/>
+              </a:ext>
+            </a:extLst>
+          </p:cNvPr>
+          <p:cNvSpPr/>
+          <p:nvPr/>
+        </p:nvSpPr>
+        <p:spPr>
+          <a:xfrm>
+            <a:off x="8458381" y="5931452"/>
+            <a:ext cx="629586" cy="424898"/>
+          </a:xfrm>
+          <a:prstGeom prst="rect">
+            <a:avLst/>
+          </a:prstGeom>
+        </p:spPr>
+        <p:style>
+          <a:lnRef idx="2">
+            <a:schemeClr val="accent1">
+              <a:shade val="50000"/>
+            </a:schemeClr>
+          </a:lnRef>
+          <a:fillRef idx="1">
+            <a:schemeClr val="accent1"/>
+          </a:fillRef>
+          <a:effectRef idx="0">
+            <a:schemeClr val="accent1"/>
+          </a:effectRef>
+          <a:fontRef idx="minor">
+            <a:schemeClr val="lt1"/>
+          </a:fontRef>
+        </p:style>
+        <p:txBody>
+          <a:bodyPr rtlCol="0" anchor="ctr"/>
+          <a:lstStyle/>
+          <a:p>
+            <a:pPr algn="ctr"/>
+            <a:r>
+              <a:rPr lang="en-NO" dirty="0"/>
+              <a:t>E</a:t>
+            </a:r>
+          </a:p>
+        </p:txBody>
+      </p:sp>
+      <p:sp>
+        <p:nvSpPr>
+          <p:cNvPr id="42" name="Rectangle 41">
+            <a:extLst>
+              <a:ext uri="{FF2B5EF4-FFF2-40B4-BE49-F238E27FC236}">
+                <a16:creationId xmlns:a16="http://schemas.microsoft.com/office/drawing/2014/main" id="{741E6A62-E997-3332-D471-2CF691219FE7}"/>
+              </a:ext>
+            </a:extLst>
+          </p:cNvPr>
+          <p:cNvSpPr/>
+          <p:nvPr/>
+        </p:nvSpPr>
+        <p:spPr>
+          <a:xfrm>
+            <a:off x="9275799" y="5931452"/>
+            <a:ext cx="629586" cy="424898"/>
+          </a:xfrm>
+          <a:prstGeom prst="rect">
+            <a:avLst/>
+          </a:prstGeom>
+        </p:spPr>
+        <p:style>
+          <a:lnRef idx="2">
+            <a:schemeClr val="accent1">
+              <a:shade val="50000"/>
+            </a:schemeClr>
+          </a:lnRef>
+          <a:fillRef idx="1">
+            <a:schemeClr val="accent1"/>
+          </a:fillRef>
+          <a:effectRef idx="0">
+            <a:schemeClr val="accent1"/>
+          </a:effectRef>
+          <a:fontRef idx="minor">
+            <a:schemeClr val="lt1"/>
+          </a:fontRef>
+        </p:style>
+        <p:txBody>
+          <a:bodyPr rtlCol="0" anchor="ctr"/>
+          <a:lstStyle/>
+          <a:p>
+            <a:pPr algn="ctr"/>
+            <a:r>
+              <a:rPr lang="en-NO" dirty="0"/>
+              <a:t>O</a:t>
+            </a:r>
           </a:p>
         </p:txBody>
       </p:sp>

</xml_diff>

<commit_message>
content: Minor updates on the Graph lecture slides
</commit_message>
<xml_diff>
--- a/source/graphs/intro/_static/graphs.pptx
+++ b/source/graphs/intro/_static/graphs.pptx
@@ -224,7 +224,7 @@
           <a:p>
             <a:fld id="{84F29782-C61A-CD4C-9376-B0A272778357}" type="datetimeFigureOut">
               <a:rPr lang="en-NO" smtClean="0"/>
-              <a:t>22/10/2023</a:t>
+              <a:t>23/10/2023</a:t>
             </a:fld>
             <a:endParaRPr lang="en-NO"/>
           </a:p>
@@ -4317,10 +4317,10 @@
       </p:sp>
       <p:sp>
         <p:nvSpPr>
-          <p:cNvPr id="9" name="TextBox 8">
-            <a:extLst>
-              <a:ext uri="{FF2B5EF4-FFF2-40B4-BE49-F238E27FC236}">
-                <a16:creationId xmlns:a16="http://schemas.microsoft.com/office/drawing/2014/main" id="{2CB5D5AD-3F3B-340C-8FD1-1024D67F24BC}"/>
+          <p:cNvPr id="10" name="TextBox 9">
+            <a:extLst>
+              <a:ext uri="{FF2B5EF4-FFF2-40B4-BE49-F238E27FC236}">
+                <a16:creationId xmlns:a16="http://schemas.microsoft.com/office/drawing/2014/main" id="{AABDE3EC-5017-2AA1-F33A-22340E881B83}"/>
               </a:ext>
             </a:extLst>
           </p:cNvPr>
@@ -4329,8 +4329,8 @@
         </p:nvSpPr>
         <p:spPr>
           <a:xfrm>
-            <a:off x="7997952" y="5620413"/>
-            <a:ext cx="3681984" cy="646331"/>
+            <a:off x="8119872" y="5598588"/>
+            <a:ext cx="3578623" cy="646331"/>
           </a:xfrm>
           <a:prstGeom prst="rect">
             <a:avLst/>
@@ -4338,53 +4338,66 @@
           <a:noFill/>
         </p:spPr>
         <p:txBody>
-          <a:bodyPr wrap="square">
+          <a:bodyPr wrap="square" rtlCol="0">
             <a:spAutoFit/>
           </a:bodyPr>
           <a:lstStyle/>
           <a:p>
             <a:pPr algn="r"/>
             <a:r>
-              <a:rPr lang="en-GB" b="0" i="0" dirty="0">
+              <a:rPr lang="en-GB" i="1" dirty="0">
                 <a:solidFill>
                   <a:schemeClr val="accent6"/>
                 </a:solidFill>
                 <a:effectLst/>
                 <a:latin typeface="Montserrat" pitchFamily="2" charset="77"/>
               </a:rPr>
-              <a:t>Go to </a:t>
-            </a:r>
-            <a:r>
-              <a:rPr lang="en-GB" b="1" i="0" dirty="0" err="1">
+              <a:t>Ask questions on </a:t>
+            </a:r>
+            <a:r>
+              <a:rPr lang="en-GB" b="1" i="1" dirty="0" err="1">
                 <a:solidFill>
                   <a:schemeClr val="accent6"/>
                 </a:solidFill>
                 <a:effectLst/>
                 <a:latin typeface="Montserrat" pitchFamily="2" charset="77"/>
               </a:rPr>
-              <a:t>www.menti.com</a:t>
-            </a:r>
-            <a:r>
-              <a:rPr lang="en-GB" b="0" i="0" dirty="0">
+              <a:t>menti.com</a:t>
+            </a:r>
+            <a:r>
+              <a:rPr lang="en-GB" i="1" dirty="0">
                 <a:solidFill>
                   <a:schemeClr val="accent6"/>
                 </a:solidFill>
                 <a:effectLst/>
                 <a:latin typeface="Montserrat" pitchFamily="2" charset="77"/>
               </a:rPr>
-              <a:t> and use the code </a:t>
-            </a:r>
-            <a:r>
-              <a:rPr lang="en-GB" b="1" i="0" dirty="0">
+              <a:t> </a:t>
+            </a:r>
+          </a:p>
+          <a:p>
+            <a:pPr algn="r"/>
+            <a:r>
+              <a:rPr lang="en-GB" i="1" dirty="0">
                 <a:solidFill>
                   <a:schemeClr val="accent6"/>
                 </a:solidFill>
                 <a:effectLst/>
                 <a:latin typeface="Montserrat" pitchFamily="2" charset="77"/>
               </a:rPr>
-              <a:t>1147 7932</a:t>
-            </a:r>
-            <a:endParaRPr lang="en-NO" dirty="0">
+              <a:t>with code </a:t>
+            </a:r>
+            <a:r>
+              <a:rPr lang="en-GB" b="1" i="1" dirty="0">
+                <a:solidFill>
+                  <a:schemeClr val="accent6"/>
+                </a:solidFill>
+                <a:effectLst/>
+                <a:latin typeface="Montserrat" pitchFamily="2" charset="77"/>
+              </a:rPr>
+              <a:t>6447 9648</a:t>
+            </a:r>
+            <a:endParaRPr lang="en-NO" b="1" i="1" dirty="0">
               <a:solidFill>
                 <a:schemeClr val="accent6"/>
               </a:solidFill>

</xml_diff>